<commit_message>
Add note on sustainability
</commit_message>
<xml_diff>
--- a/intro-to-python.pptx
+++ b/intro-to-python.pptx
@@ -5,7 +5,7 @@
     <p:sldMasterId id="2147483659" r:id="rId1"/>
   </p:sldMasterIdLst>
   <p:notesMasterIdLst>
-    <p:notesMasterId r:id="rId10"/>
+    <p:notesMasterId r:id="rId11"/>
   </p:notesMasterIdLst>
   <p:sldIdLst>
     <p:sldId id="256" r:id="rId2"/>
@@ -15,7 +15,8 @@
     <p:sldId id="263" r:id="rId6"/>
     <p:sldId id="264" r:id="rId7"/>
     <p:sldId id="265" r:id="rId8"/>
-    <p:sldId id="266" r:id="rId9"/>
+    <p:sldId id="267" r:id="rId9"/>
+    <p:sldId id="266" r:id="rId10"/>
   </p:sldIdLst>
   <p:sldSz cx="12192000" cy="6858000"/>
   <p:notesSz cx="6858000" cy="9144000"/>
@@ -29159,6 +29160,144 @@
           <a:lstStyle/>
           <a:p>
             <a:r>
+              <a:rPr lang="en-US" sz="2000" dirty="0" smtClean="0"/>
+              <a:t>Open Source continues to flourish because of the community</a:t>
+            </a:r>
+          </a:p>
+          <a:p>
+            <a:r>
+              <a:rPr lang="en-US" sz="2000" dirty="0" smtClean="0"/>
+              <a:t>Do you use open source software at work?</a:t>
+            </a:r>
+          </a:p>
+          <a:p>
+            <a:pPr lvl="1"/>
+            <a:r>
+              <a:rPr lang="en-US" sz="2000" dirty="0" smtClean="0"/>
+              <a:t>Ask your employer to give back</a:t>
+            </a:r>
+          </a:p>
+          <a:p>
+            <a:r>
+              <a:rPr lang="en-US" sz="2000" dirty="0" smtClean="0"/>
+              <a:t>Do you manage a team that is high-leverage because of open source software? Or manage up to such a person?</a:t>
+            </a:r>
+          </a:p>
+          <a:p>
+            <a:pPr lvl="1"/>
+            <a:r>
+              <a:rPr lang="en-US" sz="2000" dirty="0" smtClean="0"/>
+              <a:t>Carve out time for contributing back to open source projects (documentation, bug fixes, features, release support)</a:t>
+            </a:r>
+          </a:p>
+          <a:p>
+            <a:r>
+              <a:rPr lang="en-US" sz="2000" dirty="0" smtClean="0"/>
+              <a:t>Have you done well in your career through open source software?</a:t>
+            </a:r>
+          </a:p>
+          <a:p>
+            <a:pPr lvl="1"/>
+            <a:r>
+              <a:rPr lang="en-US" sz="2000" dirty="0" smtClean="0"/>
+              <a:t>Consider donating your time, if you can, or money to open source projects</a:t>
+            </a:r>
+          </a:p>
+          <a:p>
+            <a:r>
+              <a:rPr lang="en-US" sz="2000" dirty="0" smtClean="0"/>
+              <a:t>How?</a:t>
+            </a:r>
+          </a:p>
+          <a:p>
+            <a:pPr lvl="1"/>
+            <a:r>
+              <a:rPr lang="en-US" sz="2000" dirty="0" smtClean="0"/>
+              <a:t>The </a:t>
+            </a:r>
+            <a:r>
+              <a:rPr lang="en-US" sz="2000" dirty="0" smtClean="0">
+                <a:hlinkClick r:id="rId2"/>
+              </a:rPr>
+              <a:t>NumFOCUS Foundation</a:t>
+            </a:r>
+            <a:r>
+              <a:rPr lang="en-US" sz="2000" dirty="0" smtClean="0"/>
+              <a:t> is a wonderful project that supports the open source community</a:t>
+            </a:r>
+            <a:endParaRPr lang="en-US" sz="2000" dirty="0"/>
+          </a:p>
+        </p:txBody>
+      </p:sp>
+      <p:sp>
+        <p:nvSpPr>
+          <p:cNvPr id="3" name="Title 2"/>
+          <p:cNvSpPr>
+            <a:spLocks noGrp="1"/>
+          </p:cNvSpPr>
+          <p:nvPr>
+            <p:ph type="title"/>
+          </p:nvPr>
+        </p:nvSpPr>
+        <p:spPr/>
+        <p:txBody>
+          <a:bodyPr/>
+          <a:lstStyle/>
+          <a:p>
+            <a:r>
+              <a:rPr lang="en-US" dirty="0" smtClean="0"/>
+              <a:t>Sustainability</a:t>
+            </a:r>
+            <a:endParaRPr lang="en-US" dirty="0"/>
+          </a:p>
+        </p:txBody>
+      </p:sp>
+    </p:spTree>
+    <p:extLst>
+      <p:ext uri="{BB962C8B-B14F-4D97-AF65-F5344CB8AC3E}">
+        <p14:creationId xmlns:p14="http://schemas.microsoft.com/office/powerpoint/2010/main" val="212223369"/>
+      </p:ext>
+    </p:extLst>
+  </p:cSld>
+  <p:clrMapOvr>
+    <a:masterClrMapping/>
+  </p:clrMapOvr>
+</p:sld>
+</file>
+
+<file path=ppt/slides/slide9.xml><?xml version="1.0" encoding="utf-8"?>
+<p:sld xmlns:a="http://schemas.openxmlformats.org/drawingml/2006/main" xmlns:r="http://schemas.openxmlformats.org/officeDocument/2006/relationships" xmlns:p="http://schemas.openxmlformats.org/presentationml/2006/main">
+  <p:cSld>
+    <p:spTree>
+      <p:nvGrpSpPr>
+        <p:cNvPr id="1" name=""/>
+        <p:cNvGrpSpPr/>
+        <p:nvPr/>
+      </p:nvGrpSpPr>
+      <p:grpSpPr>
+        <a:xfrm>
+          <a:off x="0" y="0"/>
+          <a:ext cx="0" cy="0"/>
+          <a:chOff x="0" y="0"/>
+          <a:chExt cx="0" cy="0"/>
+        </a:xfrm>
+      </p:grpSpPr>
+      <p:sp>
+        <p:nvSpPr>
+          <p:cNvPr id="2" name="Text Placeholder 1"/>
+          <p:cNvSpPr>
+            <a:spLocks noGrp="1"/>
+          </p:cNvSpPr>
+          <p:nvPr>
+            <p:ph type="body" sz="quarter" idx="16"/>
+          </p:nvPr>
+        </p:nvSpPr>
+        <p:spPr/>
+        <p:txBody>
+          <a:bodyPr/>
+          <a:lstStyle/>
+          <a:p>
+            <a:r>
               <a:rPr lang="en-US" sz="2400" dirty="0" smtClean="0"/>
               <a:t>Assumptions</a:t>
             </a:r>
@@ -29187,13 +29326,8 @@
           <a:p>
             <a:r>
               <a:rPr lang="en-US" sz="2400" dirty="0" smtClean="0"/>
-              <a:t>Feel free to stop me and </a:t>
+              <a:t>Feel free to stop me and ask questions</a:t>
             </a:r>
-            <a:r>
-              <a:rPr lang="en-US" sz="2400" smtClean="0"/>
-              <a:t>ask questions</a:t>
-            </a:r>
-            <a:endParaRPr lang="en-US" sz="2400" dirty="0" smtClean="0"/>
           </a:p>
         </p:txBody>
       </p:sp>

</xml_diff>

<commit_message>
Link to workshop materials
</commit_message>
<xml_diff>
--- a/intro-to-python.pptx
+++ b/intro-to-python.pptx
@@ -28281,6 +28281,59 @@
             <a:r>
               <a:rPr lang="en-US" sz="2400" b="0" dirty="0" smtClean="0"/>
               <a:t> projects</a:t>
+            </a:r>
+          </a:p>
+          <a:p>
+            <a:r>
+              <a:rPr lang="en-US" sz="2400" b="0" dirty="0" smtClean="0"/>
+              <a:t>Workshop Materials (Follow instructions, Unzip the data in the data/ directory)</a:t>
+            </a:r>
+          </a:p>
+          <a:p>
+            <a:pPr marL="0" indent="0">
+              <a:buNone/>
+            </a:pPr>
+            <a:endParaRPr lang="en-US" sz="2400" b="0" dirty="0" smtClean="0"/>
+          </a:p>
+          <a:p>
+            <a:pPr marL="0" indent="0" algn="ctr">
+              <a:buNone/>
+            </a:pPr>
+            <a:r>
+              <a:rPr lang="en-US" sz="2400" b="0" dirty="0" smtClean="0">
+                <a:hlinkClick r:id="rId2"/>
+              </a:rPr>
+              <a:t>https</a:t>
+            </a:r>
+            <a:r>
+              <a:rPr lang="en-US" sz="2400" b="0" dirty="0">
+                <a:hlinkClick r:id="rId2"/>
+              </a:rPr>
+              <a:t>://</a:t>
+            </a:r>
+            <a:r>
+              <a:rPr lang="en-US" sz="2400" b="0" dirty="0" err="1">
+                <a:hlinkClick r:id="rId2"/>
+              </a:rPr>
+              <a:t>github.com</a:t>
+            </a:r>
+            <a:r>
+              <a:rPr lang="en-US" sz="2400" b="0" dirty="0">
+                <a:hlinkClick r:id="rId2"/>
+              </a:rPr>
+              <a:t>/</a:t>
+            </a:r>
+            <a:r>
+              <a:rPr lang="en-US" sz="2400" b="0" dirty="0" err="1">
+                <a:hlinkClick r:id="rId2"/>
+              </a:rPr>
+              <a:t>jseabold</a:t>
+            </a:r>
+            <a:r>
+              <a:rPr lang="en-US" sz="2400" b="0" dirty="0">
+                <a:hlinkClick r:id="rId2"/>
+              </a:rPr>
+              <a:t>/odsc-west-python-2017</a:t>
             </a:r>
             <a:endParaRPr lang="en-US" sz="2400" b="0" dirty="0"/>
           </a:p>

</xml_diff>